<commit_message>
Add experimental results for the completeness
</commit_message>
<xml_diff>
--- a/all_ivcs/experiments/experimental_results/Experimental Results.pptx
+++ b/all_ivcs/experiments/experimental_results/Experimental Results.pptx
@@ -10,8 +10,8 @@
     <p:sldId id="260" r:id="rId4"/>
     <p:sldId id="261" r:id="rId5"/>
     <p:sldId id="258" r:id="rId6"/>
-    <p:sldId id="262" r:id="rId7"/>
-    <p:sldId id="263" r:id="rId8"/>
+    <p:sldId id="269" r:id="rId7"/>
+    <p:sldId id="262" r:id="rId8"/>
     <p:sldId id="264" r:id="rId9"/>
     <p:sldId id="265" r:id="rId10"/>
     <p:sldId id="259" r:id="rId11"/>
@@ -254,7 +254,7 @@
           <a:p>
             <a:fld id="{899D766E-60EA-40D4-8F02-6F5AC76A935E}" type="datetimeFigureOut">
               <a:rPr lang="en-US" smtClean="0"/>
-              <a:t>8/10/2016</a:t>
+              <a:t>8/11/2016</a:t>
             </a:fld>
             <a:endParaRPr lang="en-US"/>
           </a:p>
@@ -424,7 +424,7 @@
           <a:p>
             <a:fld id="{899D766E-60EA-40D4-8F02-6F5AC76A935E}" type="datetimeFigureOut">
               <a:rPr lang="en-US" smtClean="0"/>
-              <a:t>8/10/2016</a:t>
+              <a:t>8/11/2016</a:t>
             </a:fld>
             <a:endParaRPr lang="en-US"/>
           </a:p>
@@ -604,7 +604,7 @@
           <a:p>
             <a:fld id="{899D766E-60EA-40D4-8F02-6F5AC76A935E}" type="datetimeFigureOut">
               <a:rPr lang="en-US" smtClean="0"/>
-              <a:t>8/10/2016</a:t>
+              <a:t>8/11/2016</a:t>
             </a:fld>
             <a:endParaRPr lang="en-US"/>
           </a:p>
@@ -774,7 +774,7 @@
           <a:p>
             <a:fld id="{899D766E-60EA-40D4-8F02-6F5AC76A935E}" type="datetimeFigureOut">
               <a:rPr lang="en-US" smtClean="0"/>
-              <a:t>8/10/2016</a:t>
+              <a:t>8/11/2016</a:t>
             </a:fld>
             <a:endParaRPr lang="en-US"/>
           </a:p>
@@ -1020,7 +1020,7 @@
           <a:p>
             <a:fld id="{899D766E-60EA-40D4-8F02-6F5AC76A935E}" type="datetimeFigureOut">
               <a:rPr lang="en-US" smtClean="0"/>
-              <a:t>8/10/2016</a:t>
+              <a:t>8/11/2016</a:t>
             </a:fld>
             <a:endParaRPr lang="en-US"/>
           </a:p>
@@ -1252,7 +1252,7 @@
           <a:p>
             <a:fld id="{899D766E-60EA-40D4-8F02-6F5AC76A935E}" type="datetimeFigureOut">
               <a:rPr lang="en-US" smtClean="0"/>
-              <a:t>8/10/2016</a:t>
+              <a:t>8/11/2016</a:t>
             </a:fld>
             <a:endParaRPr lang="en-US"/>
           </a:p>
@@ -1619,7 +1619,7 @@
           <a:p>
             <a:fld id="{899D766E-60EA-40D4-8F02-6F5AC76A935E}" type="datetimeFigureOut">
               <a:rPr lang="en-US" smtClean="0"/>
-              <a:t>8/10/2016</a:t>
+              <a:t>8/11/2016</a:t>
             </a:fld>
             <a:endParaRPr lang="en-US"/>
           </a:p>
@@ -1737,7 +1737,7 @@
           <a:p>
             <a:fld id="{899D766E-60EA-40D4-8F02-6F5AC76A935E}" type="datetimeFigureOut">
               <a:rPr lang="en-US" smtClean="0"/>
-              <a:t>8/10/2016</a:t>
+              <a:t>8/11/2016</a:t>
             </a:fld>
             <a:endParaRPr lang="en-US"/>
           </a:p>
@@ -1832,7 +1832,7 @@
           <a:p>
             <a:fld id="{899D766E-60EA-40D4-8F02-6F5AC76A935E}" type="datetimeFigureOut">
               <a:rPr lang="en-US" smtClean="0"/>
-              <a:t>8/10/2016</a:t>
+              <a:t>8/11/2016</a:t>
             </a:fld>
             <a:endParaRPr lang="en-US"/>
           </a:p>
@@ -2109,7 +2109,7 @@
           <a:p>
             <a:fld id="{899D766E-60EA-40D4-8F02-6F5AC76A935E}" type="datetimeFigureOut">
               <a:rPr lang="en-US" smtClean="0"/>
-              <a:t>8/10/2016</a:t>
+              <a:t>8/11/2016</a:t>
             </a:fld>
             <a:endParaRPr lang="en-US"/>
           </a:p>
@@ -2362,7 +2362,7 @@
           <a:p>
             <a:fld id="{899D766E-60EA-40D4-8F02-6F5AC76A935E}" type="datetimeFigureOut">
               <a:rPr lang="en-US" smtClean="0"/>
-              <a:t>8/10/2016</a:t>
+              <a:t>8/11/2016</a:t>
             </a:fld>
             <a:endParaRPr lang="en-US"/>
           </a:p>
@@ -2575,7 +2575,7 @@
           <a:p>
             <a:fld id="{899D766E-60EA-40D4-8F02-6F5AC76A935E}" type="datetimeFigureOut">
               <a:rPr lang="en-US" smtClean="0"/>
-              <a:t>8/10/2016</a:t>
+              <a:t>8/11/2016</a:t>
             </a:fld>
             <a:endParaRPr lang="en-US"/>
           </a:p>
@@ -3590,7 +3590,7 @@
             <p:ph idx="1"/>
             <p:extLst>
               <p:ext uri="{D42A27DB-BD31-4B8C-83A1-F6EECF244321}">
-                <p14:modId xmlns:p14="http://schemas.microsoft.com/office/powerpoint/2010/main" val="2466216593"/>
+                <p14:modId xmlns:p14="http://schemas.microsoft.com/office/powerpoint/2010/main" val="1490285779"/>
               </p:ext>
             </p:extLst>
           </p:nvPr>
@@ -3959,52 +3959,52 @@
                       <a:pPr algn="ctr"/>
                       <a:r>
                         <a:rPr lang="en-US" dirty="0" smtClean="0"/>
-                        <a:t>21.516%</a:t>
-                      </a:r>
-                      <a:endParaRPr lang="en-US" dirty="0"/>
-                    </a:p>
-                  </a:txBody>
-                  <a:tcPr anchor="ctr"/>
-                </a:tc>
-                <a:tc>
-                  <a:txBody>
-                    <a:bodyPr/>
-                    <a:lstStyle/>
-                    <a:p>
-                      <a:pPr algn="ctr"/>
-                      <a:r>
-                        <a:rPr lang="en-US" dirty="0" smtClean="0"/>
-                        <a:t>9736.479%</a:t>
-                      </a:r>
-                      <a:endParaRPr lang="en-US" dirty="0"/>
-                    </a:p>
-                  </a:txBody>
-                  <a:tcPr anchor="ctr"/>
-                </a:tc>
-                <a:tc>
-                  <a:txBody>
-                    <a:bodyPr/>
-                    <a:lstStyle/>
-                    <a:p>
-                      <a:pPr algn="ctr"/>
-                      <a:r>
-                        <a:rPr lang="en-US" dirty="0" smtClean="0"/>
-                        <a:t>1037.914%</a:t>
-                      </a:r>
-                      <a:endParaRPr lang="en-US" dirty="0"/>
-                    </a:p>
-                  </a:txBody>
-                  <a:tcPr anchor="ctr"/>
-                </a:tc>
-                <a:tc>
-                  <a:txBody>
-                    <a:bodyPr/>
-                    <a:lstStyle/>
-                    <a:p>
-                      <a:pPr algn="ctr"/>
-                      <a:r>
-                        <a:rPr lang="en-US" dirty="0" smtClean="0"/>
-                        <a:t>1415.119%</a:t>
+                        <a:t>23.033%</a:t>
+                      </a:r>
+                      <a:endParaRPr lang="en-US" dirty="0"/>
+                    </a:p>
+                  </a:txBody>
+                  <a:tcPr anchor="ctr"/>
+                </a:tc>
+                <a:tc>
+                  <a:txBody>
+                    <a:bodyPr/>
+                    <a:lstStyle/>
+                    <a:p>
+                      <a:pPr algn="ctr"/>
+                      <a:r>
+                        <a:rPr lang="en-US" dirty="0" smtClean="0"/>
+                        <a:t>9738.860%</a:t>
+                      </a:r>
+                      <a:endParaRPr lang="en-US" dirty="0"/>
+                    </a:p>
+                  </a:txBody>
+                  <a:tcPr anchor="ctr"/>
+                </a:tc>
+                <a:tc>
+                  <a:txBody>
+                    <a:bodyPr/>
+                    <a:lstStyle/>
+                    <a:p>
+                      <a:pPr algn="ctr"/>
+                      <a:r>
+                        <a:rPr lang="en-US" dirty="0" smtClean="0"/>
+                        <a:t>1048.532%</a:t>
+                      </a:r>
+                      <a:endParaRPr lang="en-US" dirty="0"/>
+                    </a:p>
+                  </a:txBody>
+                  <a:tcPr anchor="ctr"/>
+                </a:tc>
+                <a:tc>
+                  <a:txBody>
+                    <a:bodyPr/>
+                    <a:lstStyle/>
+                    <a:p>
+                      <a:pPr algn="ctr"/>
+                      <a:r>
+                        <a:rPr lang="en-US" dirty="0" smtClean="0"/>
+                        <a:t>1419.658%</a:t>
                       </a:r>
                       <a:endParaRPr lang="en-US" dirty="0"/>
                     </a:p>
@@ -4076,34 +4076,13 @@
           <a:chExt cx="0" cy="0"/>
         </a:xfrm>
       </p:grpSpPr>
-      <p:sp>
-        <p:nvSpPr>
-          <p:cNvPr id="2" name="Title 1"/>
-          <p:cNvSpPr>
-            <a:spLocks noGrp="1"/>
-          </p:cNvSpPr>
-          <p:nvPr>
-            <p:ph type="title"/>
-          </p:nvPr>
-        </p:nvSpPr>
-        <p:spPr/>
-        <p:txBody>
-          <a:bodyPr/>
-          <a:lstStyle/>
-          <a:p>
-            <a:endParaRPr lang="en-US"/>
-          </a:p>
-        </p:txBody>
-      </p:sp>
       <p:pic>
         <p:nvPicPr>
-          <p:cNvPr id="6" name="Content Placeholder 5"/>
+          <p:cNvPr id="3" name="Picture 2"/>
           <p:cNvPicPr>
-            <a:picLocks noGrp="1" noChangeAspect="1"/>
+            <a:picLocks noChangeAspect="1"/>
           </p:cNvPicPr>
-          <p:nvPr>
-            <p:ph idx="1"/>
-          </p:nvPr>
+          <p:nvPr/>
         </p:nvPicPr>
         <p:blipFill>
           <a:blip r:embed="rId2">
@@ -4119,9 +4098,12 @@
         </p:blipFill>
         <p:spPr>
           <a:xfrm>
-            <a:off x="65834" y="262466"/>
-            <a:ext cx="12014732" cy="6536267"/>
+            <a:off x="251581" y="308301"/>
+            <a:ext cx="11796485" cy="6417536"/>
           </a:xfrm>
+          <a:prstGeom prst="rect">
+            <a:avLst/>
+          </a:prstGeom>
         </p:spPr>
       </p:pic>
     </p:spTree>
@@ -4175,7 +4157,7 @@
       </p:sp>
       <p:pic>
         <p:nvPicPr>
-          <p:cNvPr id="5" name="Content Placeholder 4"/>
+          <p:cNvPr id="7" name="Content Placeholder 6"/>
           <p:cNvPicPr>
             <a:picLocks noGrp="1" noChangeAspect="1"/>
           </p:cNvPicPr>
@@ -4197,8 +4179,8 @@
         </p:blipFill>
         <p:spPr>
           <a:xfrm>
-            <a:off x="296334" y="152400"/>
-            <a:ext cx="11524812" cy="6510867"/>
+            <a:off x="157897" y="233891"/>
+            <a:ext cx="11813970" cy="6427048"/>
           </a:xfrm>
         </p:spPr>
       </p:pic>
@@ -4265,7 +4247,7 @@
             <p:ph idx="1"/>
             <p:extLst>
               <p:ext uri="{D42A27DB-BD31-4B8C-83A1-F6EECF244321}">
-                <p14:modId xmlns:p14="http://schemas.microsoft.com/office/powerpoint/2010/main" val="1392635223"/>
+                <p14:modId xmlns:p14="http://schemas.microsoft.com/office/powerpoint/2010/main" val="1215703056"/>
               </p:ext>
             </p:extLst>
           </p:nvPr>
@@ -4650,52 +4632,52 @@
                       <a:pPr algn="ctr"/>
                       <a:r>
                         <a:rPr lang="en-US" dirty="0" smtClean="0"/>
-                        <a:t>0.203</a:t>
-                      </a:r>
-                      <a:endParaRPr lang="en-US" dirty="0"/>
-                    </a:p>
-                  </a:txBody>
-                  <a:tcPr anchor="ctr"/>
-                </a:tc>
-                <a:tc>
-                  <a:txBody>
-                    <a:bodyPr/>
-                    <a:lstStyle/>
-                    <a:p>
-                      <a:pPr algn="ctr"/>
-                      <a:r>
-                        <a:rPr lang="en-US" dirty="0" smtClean="0"/>
-                        <a:t>1286.307</a:t>
-                      </a:r>
-                      <a:endParaRPr lang="en-US" dirty="0"/>
-                    </a:p>
-                  </a:txBody>
-                  <a:tcPr anchor="ctr"/>
-                </a:tc>
-                <a:tc>
-                  <a:txBody>
-                    <a:bodyPr/>
-                    <a:lstStyle/>
-                    <a:p>
-                      <a:pPr algn="ctr"/>
-                      <a:r>
-                        <a:rPr lang="en-US" dirty="0" smtClean="0"/>
-                        <a:t>20.692</a:t>
-                      </a:r>
-                      <a:endParaRPr lang="en-US" dirty="0"/>
-                    </a:p>
-                  </a:txBody>
-                  <a:tcPr anchor="ctr"/>
-                </a:tc>
-                <a:tc>
-                  <a:txBody>
-                    <a:bodyPr/>
-                    <a:lstStyle/>
-                    <a:p>
-                      <a:pPr algn="ctr"/>
-                      <a:r>
-                        <a:rPr lang="en-US" dirty="0" smtClean="0"/>
-                        <a:t>108.600</a:t>
+                        <a:t>0.219</a:t>
+                      </a:r>
+                      <a:endParaRPr lang="en-US" dirty="0"/>
+                    </a:p>
+                  </a:txBody>
+                  <a:tcPr anchor="ctr"/>
+                </a:tc>
+                <a:tc>
+                  <a:txBody>
+                    <a:bodyPr/>
+                    <a:lstStyle/>
+                    <a:p>
+                      <a:pPr algn="ctr"/>
+                      <a:r>
+                        <a:rPr lang="en-US" dirty="0" smtClean="0"/>
+                        <a:t>1286.479</a:t>
+                      </a:r>
+                      <a:endParaRPr lang="en-US" dirty="0"/>
+                    </a:p>
+                  </a:txBody>
+                  <a:tcPr anchor="ctr"/>
+                </a:tc>
+                <a:tc>
+                  <a:txBody>
+                    <a:bodyPr/>
+                    <a:lstStyle/>
+                    <a:p>
+                      <a:pPr algn="ctr"/>
+                      <a:r>
+                        <a:rPr lang="en-US" dirty="0" smtClean="0"/>
+                        <a:t>20.776</a:t>
+                      </a:r>
+                      <a:endParaRPr lang="en-US" dirty="0"/>
+                    </a:p>
+                  </a:txBody>
+                  <a:tcPr anchor="ctr"/>
+                </a:tc>
+                <a:tc>
+                  <a:txBody>
+                    <a:bodyPr/>
+                    <a:lstStyle/>
+                    <a:p>
+                      <a:pPr algn="ctr"/>
+                      <a:r>
+                        <a:rPr lang="en-US" dirty="0" smtClean="0"/>
+                        <a:t>108.626</a:t>
                       </a:r>
                       <a:endParaRPr lang="en-US" dirty="0"/>
                     </a:p>
@@ -5066,7 +5048,7 @@
       </p:sp>
       <p:pic>
         <p:nvPicPr>
-          <p:cNvPr id="5" name="Content Placeholder 4"/>
+          <p:cNvPr id="4" name="Content Placeholder 3"/>
           <p:cNvPicPr>
             <a:picLocks noGrp="1" noChangeAspect="1"/>
           </p:cNvPicPr>
@@ -5088,15 +5070,15 @@
         </p:blipFill>
         <p:spPr>
           <a:xfrm>
-            <a:off x="188644" y="177800"/>
-            <a:ext cx="11825556" cy="6433351"/>
+            <a:off x="411895" y="225425"/>
+            <a:ext cx="11522547" cy="6268508"/>
           </a:xfrm>
         </p:spPr>
       </p:pic>
     </p:spTree>
     <p:extLst>
       <p:ext uri="{BB962C8B-B14F-4D97-AF65-F5344CB8AC3E}">
-        <p14:creationId xmlns:p14="http://schemas.microsoft.com/office/powerpoint/2010/main" val="356758851"/>
+        <p14:creationId xmlns:p14="http://schemas.microsoft.com/office/powerpoint/2010/main" val="558616771"/>
       </p:ext>
     </p:extLst>
   </p:cSld>
@@ -5144,7 +5126,7 @@
       </p:sp>
       <p:pic>
         <p:nvPicPr>
-          <p:cNvPr id="5" name="Content Placeholder 4"/>
+          <p:cNvPr id="4" name="Content Placeholder 3"/>
           <p:cNvPicPr>
             <a:picLocks noGrp="1" noChangeAspect="1"/>
           </p:cNvPicPr>
@@ -5166,15 +5148,15 @@
         </p:blipFill>
         <p:spPr>
           <a:xfrm>
-            <a:off x="301829" y="233892"/>
-            <a:ext cx="11569237" cy="6370108"/>
+            <a:off x="194732" y="360097"/>
+            <a:ext cx="11773017" cy="6404769"/>
           </a:xfrm>
         </p:spPr>
       </p:pic>
     </p:spTree>
     <p:extLst>
       <p:ext uri="{BB962C8B-B14F-4D97-AF65-F5344CB8AC3E}">
-        <p14:creationId xmlns:p14="http://schemas.microsoft.com/office/powerpoint/2010/main" val="567552108"/>
+        <p14:creationId xmlns:p14="http://schemas.microsoft.com/office/powerpoint/2010/main" val="356758851"/>
       </p:ext>
     </p:extLst>
   </p:cSld>

</xml_diff>

<commit_message>
update the experimental results after changing ucbf & timeout
</commit_message>
<xml_diff>
--- a/all_ivcs/experiments/experimental_results/Experimental Results.pptx
+++ b/all_ivcs/experiments/experimental_results/Experimental Results.pptx
@@ -254,7 +254,7 @@
           <a:p>
             <a:fld id="{899D766E-60EA-40D4-8F02-6F5AC76A935E}" type="datetimeFigureOut">
               <a:rPr lang="en-US" smtClean="0"/>
-              <a:t>8/11/2016</a:t>
+              <a:t>8/14/2016</a:t>
             </a:fld>
             <a:endParaRPr lang="en-US"/>
           </a:p>
@@ -424,7 +424,7 @@
           <a:p>
             <a:fld id="{899D766E-60EA-40D4-8F02-6F5AC76A935E}" type="datetimeFigureOut">
               <a:rPr lang="en-US" smtClean="0"/>
-              <a:t>8/11/2016</a:t>
+              <a:t>8/14/2016</a:t>
             </a:fld>
             <a:endParaRPr lang="en-US"/>
           </a:p>
@@ -604,7 +604,7 @@
           <a:p>
             <a:fld id="{899D766E-60EA-40D4-8F02-6F5AC76A935E}" type="datetimeFigureOut">
               <a:rPr lang="en-US" smtClean="0"/>
-              <a:t>8/11/2016</a:t>
+              <a:t>8/14/2016</a:t>
             </a:fld>
             <a:endParaRPr lang="en-US"/>
           </a:p>
@@ -774,7 +774,7 @@
           <a:p>
             <a:fld id="{899D766E-60EA-40D4-8F02-6F5AC76A935E}" type="datetimeFigureOut">
               <a:rPr lang="en-US" smtClean="0"/>
-              <a:t>8/11/2016</a:t>
+              <a:t>8/14/2016</a:t>
             </a:fld>
             <a:endParaRPr lang="en-US"/>
           </a:p>
@@ -1020,7 +1020,7 @@
           <a:p>
             <a:fld id="{899D766E-60EA-40D4-8F02-6F5AC76A935E}" type="datetimeFigureOut">
               <a:rPr lang="en-US" smtClean="0"/>
-              <a:t>8/11/2016</a:t>
+              <a:t>8/14/2016</a:t>
             </a:fld>
             <a:endParaRPr lang="en-US"/>
           </a:p>
@@ -1252,7 +1252,7 @@
           <a:p>
             <a:fld id="{899D766E-60EA-40D4-8F02-6F5AC76A935E}" type="datetimeFigureOut">
               <a:rPr lang="en-US" smtClean="0"/>
-              <a:t>8/11/2016</a:t>
+              <a:t>8/14/2016</a:t>
             </a:fld>
             <a:endParaRPr lang="en-US"/>
           </a:p>
@@ -1619,7 +1619,7 @@
           <a:p>
             <a:fld id="{899D766E-60EA-40D4-8F02-6F5AC76A935E}" type="datetimeFigureOut">
               <a:rPr lang="en-US" smtClean="0"/>
-              <a:t>8/11/2016</a:t>
+              <a:t>8/14/2016</a:t>
             </a:fld>
             <a:endParaRPr lang="en-US"/>
           </a:p>
@@ -1737,7 +1737,7 @@
           <a:p>
             <a:fld id="{899D766E-60EA-40D4-8F02-6F5AC76A935E}" type="datetimeFigureOut">
               <a:rPr lang="en-US" smtClean="0"/>
-              <a:t>8/11/2016</a:t>
+              <a:t>8/14/2016</a:t>
             </a:fld>
             <a:endParaRPr lang="en-US"/>
           </a:p>
@@ -1832,7 +1832,7 @@
           <a:p>
             <a:fld id="{899D766E-60EA-40D4-8F02-6F5AC76A935E}" type="datetimeFigureOut">
               <a:rPr lang="en-US" smtClean="0"/>
-              <a:t>8/11/2016</a:t>
+              <a:t>8/14/2016</a:t>
             </a:fld>
             <a:endParaRPr lang="en-US"/>
           </a:p>
@@ -2109,7 +2109,7 @@
           <a:p>
             <a:fld id="{899D766E-60EA-40D4-8F02-6F5AC76A935E}" type="datetimeFigureOut">
               <a:rPr lang="en-US" smtClean="0"/>
-              <a:t>8/11/2016</a:t>
+              <a:t>8/14/2016</a:t>
             </a:fld>
             <a:endParaRPr lang="en-US"/>
           </a:p>
@@ -2362,7 +2362,7 @@
           <a:p>
             <a:fld id="{899D766E-60EA-40D4-8F02-6F5AC76A935E}" type="datetimeFigureOut">
               <a:rPr lang="en-US" smtClean="0"/>
-              <a:t>8/11/2016</a:t>
+              <a:t>8/14/2016</a:t>
             </a:fld>
             <a:endParaRPr lang="en-US"/>
           </a:p>
@@ -2575,7 +2575,7 @@
           <a:p>
             <a:fld id="{899D766E-60EA-40D4-8F02-6F5AC76A935E}" type="datetimeFigureOut">
               <a:rPr lang="en-US" smtClean="0"/>
-              <a:t>8/11/2016</a:t>
+              <a:t>8/14/2016</a:t>
             </a:fld>
             <a:endParaRPr lang="en-US"/>
           </a:p>
@@ -3093,7 +3093,7 @@
             <p:ph idx="1"/>
             <p:extLst>
               <p:ext uri="{D42A27DB-BD31-4B8C-83A1-F6EECF244321}">
-                <p14:modId xmlns:p14="http://schemas.microsoft.com/office/powerpoint/2010/main" val="3074297325"/>
+                <p14:modId xmlns:p14="http://schemas.microsoft.com/office/powerpoint/2010/main" val="1618058022"/>
               </p:ext>
             </p:extLst>
           </p:nvPr>
@@ -3188,22 +3188,22 @@
                       <a:pPr algn="ctr"/>
                       <a:r>
                         <a:rPr lang="en-US" dirty="0" smtClean="0"/>
-                        <a:t>0.89</a:t>
-                      </a:r>
-                      <a:endParaRPr lang="en-US" dirty="0"/>
-                    </a:p>
-                  </a:txBody>
-                  <a:tcPr anchor="ctr"/>
-                </a:tc>
-                <a:tc>
-                  <a:txBody>
-                    <a:bodyPr/>
-                    <a:lstStyle/>
-                    <a:p>
-                      <a:pPr algn="ctr"/>
-                      <a:r>
-                        <a:rPr lang="en-US" dirty="0" smtClean="0"/>
-                        <a:t>7.88</a:t>
+                        <a:t>0.78</a:t>
+                      </a:r>
+                      <a:endParaRPr lang="en-US" dirty="0"/>
+                    </a:p>
+                  </a:txBody>
+                  <a:tcPr anchor="ctr"/>
+                </a:tc>
+                <a:tc>
+                  <a:txBody>
+                    <a:bodyPr/>
+                    <a:lstStyle/>
+                    <a:p>
+                      <a:pPr algn="ctr"/>
+                      <a:r>
+                        <a:rPr lang="en-US" dirty="0" smtClean="0"/>
+                        <a:t>7.91</a:t>
                       </a:r>
                       <a:endParaRPr lang="en-US" dirty="0"/>
                     </a:p>
@@ -3251,21 +3251,22 @@
                       </a:pPr>
                       <a:r>
                         <a:rPr lang="en-US" dirty="0" smtClean="0"/>
-                        <a:t>2.55</a:t>
-                      </a:r>
-                    </a:p>
-                  </a:txBody>
-                  <a:tcPr anchor="ctr"/>
-                </a:tc>
-                <a:tc>
-                  <a:txBody>
-                    <a:bodyPr/>
-                    <a:lstStyle/>
-                    <a:p>
-                      <a:pPr algn="ctr"/>
-                      <a:r>
-                        <a:rPr lang="en-US" dirty="0" smtClean="0"/>
-                        <a:t>0.44</a:t>
+                        <a:t>3.3</a:t>
+                      </a:r>
+                      <a:endParaRPr lang="en-US" dirty="0" smtClean="0"/>
+                    </a:p>
+                  </a:txBody>
+                  <a:tcPr anchor="ctr"/>
+                </a:tc>
+                <a:tc>
+                  <a:txBody>
+                    <a:bodyPr/>
+                    <a:lstStyle/>
+                    <a:p>
+                      <a:pPr algn="ctr"/>
+                      <a:r>
+                        <a:rPr lang="en-US" dirty="0" smtClean="0"/>
+                        <a:t>2.95</a:t>
                       </a:r>
                       <a:endParaRPr lang="en-US" dirty="0"/>
                     </a:p>
@@ -3297,22 +3298,22 @@
                       <a:pPr algn="ctr"/>
                       <a:r>
                         <a:rPr lang="en-US" dirty="0" smtClean="0"/>
-                        <a:t>0.21</a:t>
-                      </a:r>
-                      <a:endParaRPr lang="en-US" dirty="0"/>
-                    </a:p>
-                  </a:txBody>
-                  <a:tcPr anchor="ctr"/>
-                </a:tc>
-                <a:tc>
-                  <a:txBody>
-                    <a:bodyPr/>
-                    <a:lstStyle/>
-                    <a:p>
-                      <a:pPr algn="ctr"/>
-                      <a:r>
-                        <a:rPr lang="en-US" dirty="0" smtClean="0"/>
-                        <a:t>0.92</a:t>
+                        <a:t>0.16</a:t>
+                      </a:r>
+                      <a:endParaRPr lang="en-US" dirty="0"/>
+                    </a:p>
+                  </a:txBody>
+                  <a:tcPr anchor="ctr"/>
+                </a:tc>
+                <a:tc>
+                  <a:txBody>
+                    <a:bodyPr/>
+                    <a:lstStyle/>
+                    <a:p>
+                      <a:pPr algn="ctr"/>
+                      <a:r>
+                        <a:rPr lang="en-US" dirty="0" smtClean="0"/>
+                        <a:t>0.41</a:t>
                       </a:r>
                       <a:endParaRPr lang="en-US" dirty="0"/>
                     </a:p>
@@ -3344,7 +3345,7 @@
                       <a:pPr algn="ctr"/>
                       <a:r>
                         <a:rPr lang="en-US" dirty="0" smtClean="0"/>
-                        <a:t>126.91</a:t>
+                        <a:t>141.07</a:t>
                       </a:r>
                       <a:endParaRPr lang="en-US" dirty="0"/>
                     </a:p>
@@ -3422,7 +3423,7 @@
       </p:sp>
       <p:pic>
         <p:nvPicPr>
-          <p:cNvPr id="5" name="Content Placeholder 4"/>
+          <p:cNvPr id="4" name="Content Placeholder 3"/>
           <p:cNvPicPr>
             <a:picLocks noGrp="1" noChangeAspect="1"/>
           </p:cNvPicPr>
@@ -3444,8 +3445,8 @@
         </p:blipFill>
         <p:spPr>
           <a:xfrm>
-            <a:off x="361096" y="271991"/>
-            <a:ext cx="11670037" cy="6348746"/>
+            <a:off x="267962" y="365125"/>
+            <a:ext cx="11685960" cy="6357408"/>
           </a:xfrm>
         </p:spPr>
       </p:pic>
@@ -3500,7 +3501,7 @@
       </p:sp>
       <p:pic>
         <p:nvPicPr>
-          <p:cNvPr id="5" name="Content Placeholder 4"/>
+          <p:cNvPr id="4" name="Content Placeholder 3"/>
           <p:cNvPicPr>
             <a:picLocks noGrp="1" noChangeAspect="1"/>
           </p:cNvPicPr>
@@ -3522,8 +3523,8 @@
         </p:blipFill>
         <p:spPr>
           <a:xfrm>
-            <a:off x="234097" y="301624"/>
-            <a:ext cx="11636170" cy="6330321"/>
+            <a:off x="276430" y="301625"/>
+            <a:ext cx="11755994" cy="6395508"/>
           </a:xfrm>
         </p:spPr>
       </p:pic>
@@ -3590,7 +3591,7 @@
             <p:ph idx="1"/>
             <p:extLst>
               <p:ext uri="{D42A27DB-BD31-4B8C-83A1-F6EECF244321}">
-                <p14:modId xmlns:p14="http://schemas.microsoft.com/office/powerpoint/2010/main" val="1490285779"/>
+                <p14:modId xmlns:p14="http://schemas.microsoft.com/office/powerpoint/2010/main" val="3972202247"/>
               </p:ext>
             </p:extLst>
           </p:nvPr>
@@ -3713,52 +3714,52 @@
                       <a:pPr algn="ctr"/>
                       <a:r>
                         <a:rPr lang="en-US" dirty="0" smtClean="0"/>
-                        <a:t>21.184%</a:t>
-                      </a:r>
-                      <a:endParaRPr lang="en-US" dirty="0"/>
-                    </a:p>
-                  </a:txBody>
-                  <a:tcPr anchor="ctr"/>
-                </a:tc>
-                <a:tc>
-                  <a:txBody>
-                    <a:bodyPr/>
-                    <a:lstStyle/>
-                    <a:p>
-                      <a:pPr algn="ctr"/>
-                      <a:r>
-                        <a:rPr lang="en-US" dirty="0" smtClean="0"/>
-                        <a:t>102779.901%</a:t>
-                      </a:r>
-                      <a:endParaRPr lang="en-US" dirty="0"/>
-                    </a:p>
-                  </a:txBody>
-                  <a:tcPr anchor="ctr"/>
-                </a:tc>
-                <a:tc>
-                  <a:txBody>
-                    <a:bodyPr/>
-                    <a:lstStyle/>
-                    <a:p>
-                      <a:pPr algn="ctr"/>
-                      <a:r>
-                        <a:rPr lang="en-US" dirty="0" smtClean="0"/>
-                        <a:t>1582.580%</a:t>
-                      </a:r>
-                      <a:endParaRPr lang="en-US" dirty="0"/>
-                    </a:p>
-                  </a:txBody>
-                  <a:tcPr anchor="ctr"/>
-                </a:tc>
-                <a:tc>
-                  <a:txBody>
-                    <a:bodyPr/>
-                    <a:lstStyle/>
-                    <a:p>
-                      <a:pPr algn="ctr"/>
-                      <a:r>
-                        <a:rPr lang="en-US" dirty="0" smtClean="0"/>
-                        <a:t>5046.019%</a:t>
+                        <a:t>13.642%</a:t>
+                      </a:r>
+                      <a:endParaRPr lang="en-US" dirty="0"/>
+                    </a:p>
+                  </a:txBody>
+                  <a:tcPr anchor="ctr"/>
+                </a:tc>
+                <a:tc>
+                  <a:txBody>
+                    <a:bodyPr/>
+                    <a:lstStyle/>
+                    <a:p>
+                      <a:pPr algn="ctr"/>
+                      <a:r>
+                        <a:rPr lang="en-US" dirty="0" smtClean="0"/>
+                        <a:t>101034.615%</a:t>
+                      </a:r>
+                      <a:endParaRPr lang="en-US" dirty="0"/>
+                    </a:p>
+                  </a:txBody>
+                  <a:tcPr anchor="ctr"/>
+                </a:tc>
+                <a:tc>
+                  <a:txBody>
+                    <a:bodyPr/>
+                    <a:lstStyle/>
+                    <a:p>
+                      <a:pPr algn="ctr"/>
+                      <a:r>
+                        <a:rPr lang="en-US" dirty="0" smtClean="0"/>
+                        <a:t>2544.399%</a:t>
+                      </a:r>
+                      <a:endParaRPr lang="en-US" dirty="0"/>
+                    </a:p>
+                  </a:txBody>
+                  <a:tcPr anchor="ctr"/>
+                </a:tc>
+                <a:tc>
+                  <a:txBody>
+                    <a:bodyPr/>
+                    <a:lstStyle/>
+                    <a:p>
+                      <a:pPr algn="ctr"/>
+                      <a:r>
+                        <a:rPr lang="en-US" dirty="0" smtClean="0"/>
+                        <a:t>7764.159%</a:t>
                       </a:r>
                       <a:endParaRPr lang="en-US" dirty="0"/>
                     </a:p>
@@ -3805,7 +3806,7 @@
                       <a:pPr algn="ctr"/>
                       <a:r>
                         <a:rPr lang="en-US" dirty="0" smtClean="0"/>
-                        <a:t>1686.676%</a:t>
+                        <a:t>3646.154%</a:t>
                       </a:r>
                       <a:endParaRPr lang="en-US" dirty="0"/>
                     </a:p>
@@ -3836,21 +3837,22 @@
                       </a:pPr>
                       <a:r>
                         <a:rPr lang="en-US" dirty="0" smtClean="0"/>
-                        <a:t>49.487%</a:t>
-                      </a:r>
-                    </a:p>
-                  </a:txBody>
-                  <a:tcPr anchor="ctr"/>
-                </a:tc>
-                <a:tc>
-                  <a:txBody>
-                    <a:bodyPr/>
-                    <a:lstStyle/>
-                    <a:p>
-                      <a:pPr algn="ctr"/>
-                      <a:r>
-                        <a:rPr lang="en-US" dirty="0" smtClean="0"/>
-                        <a:t>167.693%</a:t>
+                        <a:t>26.560%</a:t>
+                      </a:r>
+                      <a:endParaRPr lang="en-US" dirty="0" smtClean="0"/>
+                    </a:p>
+                  </a:txBody>
+                  <a:tcPr anchor="ctr"/>
+                </a:tc>
+                <a:tc>
+                  <a:txBody>
+                    <a:bodyPr/>
+                    <a:lstStyle/>
+                    <a:p>
+                      <a:pPr algn="ctr"/>
+                      <a:r>
+                        <a:rPr lang="en-US" dirty="0" smtClean="0"/>
+                        <a:t>181.579%</a:t>
                       </a:r>
                       <a:endParaRPr lang="en-US" dirty="0"/>
                     </a:p>
@@ -3897,37 +3899,37 @@
                       <a:pPr algn="ctr"/>
                       <a:r>
                         <a:rPr lang="en-US" dirty="0" smtClean="0"/>
-                        <a:t>114.141%</a:t>
-                      </a:r>
-                      <a:endParaRPr lang="en-US" dirty="0"/>
-                    </a:p>
-                  </a:txBody>
-                  <a:tcPr anchor="ctr"/>
-                </a:tc>
-                <a:tc>
-                  <a:txBody>
-                    <a:bodyPr/>
-                    <a:lstStyle/>
-                    <a:p>
-                      <a:pPr algn="ctr"/>
-                      <a:r>
-                        <a:rPr lang="en-US" dirty="0" smtClean="0"/>
-                        <a:t>10.618%</a:t>
-                      </a:r>
-                      <a:endParaRPr lang="en-US" dirty="0"/>
-                    </a:p>
-                  </a:txBody>
-                  <a:tcPr anchor="ctr"/>
-                </a:tc>
-                <a:tc>
-                  <a:txBody>
-                    <a:bodyPr/>
-                    <a:lstStyle/>
-                    <a:p>
-                      <a:pPr algn="ctr"/>
-                      <a:r>
-                        <a:rPr lang="en-US" dirty="0" smtClean="0"/>
-                        <a:t>13.513%</a:t>
+                        <a:t>100.0%</a:t>
+                      </a:r>
+                      <a:endParaRPr lang="en-US" dirty="0"/>
+                    </a:p>
+                  </a:txBody>
+                  <a:tcPr anchor="ctr"/>
+                </a:tc>
+                <a:tc>
+                  <a:txBody>
+                    <a:bodyPr/>
+                    <a:lstStyle/>
+                    <a:p>
+                      <a:pPr algn="ctr"/>
+                      <a:r>
+                        <a:rPr lang="en-US" dirty="0" smtClean="0"/>
+                        <a:t>10.226%</a:t>
+                      </a:r>
+                      <a:endParaRPr lang="en-US" dirty="0"/>
+                    </a:p>
+                  </a:txBody>
+                  <a:tcPr anchor="ctr"/>
+                </a:tc>
+                <a:tc>
+                  <a:txBody>
+                    <a:bodyPr/>
+                    <a:lstStyle/>
+                    <a:p>
+                      <a:pPr algn="ctr"/>
+                      <a:r>
+                        <a:rPr lang="en-US" dirty="0" smtClean="0"/>
+                        <a:t>11.718%</a:t>
                       </a:r>
                       <a:endParaRPr lang="en-US" dirty="0"/>
                     </a:p>
@@ -3959,52 +3961,52 @@
                       <a:pPr algn="ctr"/>
                       <a:r>
                         <a:rPr lang="en-US" dirty="0" smtClean="0"/>
-                        <a:t>23.033%</a:t>
-                      </a:r>
-                      <a:endParaRPr lang="en-US" dirty="0"/>
-                    </a:p>
-                  </a:txBody>
-                  <a:tcPr anchor="ctr"/>
-                </a:tc>
-                <a:tc>
-                  <a:txBody>
-                    <a:bodyPr/>
-                    <a:lstStyle/>
-                    <a:p>
-                      <a:pPr algn="ctr"/>
-                      <a:r>
-                        <a:rPr lang="en-US" dirty="0" smtClean="0"/>
-                        <a:t>9738.860%</a:t>
-                      </a:r>
-                      <a:endParaRPr lang="en-US" dirty="0"/>
-                    </a:p>
-                  </a:txBody>
-                  <a:tcPr anchor="ctr"/>
-                </a:tc>
-                <a:tc>
-                  <a:txBody>
-                    <a:bodyPr/>
-                    <a:lstStyle/>
-                    <a:p>
-                      <a:pPr algn="ctr"/>
-                      <a:r>
-                        <a:rPr lang="en-US" dirty="0" smtClean="0"/>
-                        <a:t>1048.532%</a:t>
-                      </a:r>
-                      <a:endParaRPr lang="en-US" dirty="0"/>
-                    </a:p>
-                  </a:txBody>
-                  <a:tcPr anchor="ctr"/>
-                </a:tc>
-                <a:tc>
-                  <a:txBody>
-                    <a:bodyPr/>
-                    <a:lstStyle/>
-                    <a:p>
-                      <a:pPr algn="ctr"/>
-                      <a:r>
-                        <a:rPr lang="en-US" dirty="0" smtClean="0"/>
-                        <a:t>1419.658%</a:t>
+                        <a:t>14.092%</a:t>
+                      </a:r>
+                      <a:endParaRPr lang="en-US" dirty="0"/>
+                    </a:p>
+                  </a:txBody>
+                  <a:tcPr anchor="ctr"/>
+                </a:tc>
+                <a:tc>
+                  <a:txBody>
+                    <a:bodyPr/>
+                    <a:lstStyle/>
+                    <a:p>
+                      <a:pPr algn="ctr"/>
+                      <a:r>
+                        <a:rPr lang="en-US" dirty="0" smtClean="0"/>
+                        <a:t>11124.432%</a:t>
+                      </a:r>
+                      <a:endParaRPr lang="en-US" dirty="0"/>
+                    </a:p>
+                  </a:txBody>
+                  <a:tcPr anchor="ctr"/>
+                </a:tc>
+                <a:tc>
+                  <a:txBody>
+                    <a:bodyPr/>
+                    <a:lstStyle/>
+                    <a:p>
+                      <a:pPr algn="ctr"/>
+                      <a:r>
+                        <a:rPr lang="en-US" dirty="0" smtClean="0"/>
+                        <a:t>882.018%</a:t>
+                      </a:r>
+                      <a:endParaRPr lang="en-US" dirty="0"/>
+                    </a:p>
+                  </a:txBody>
+                  <a:tcPr anchor="ctr"/>
+                </a:tc>
+                <a:tc>
+                  <a:txBody>
+                    <a:bodyPr/>
+                    <a:lstStyle/>
+                    <a:p>
+                      <a:pPr algn="ctr"/>
+                      <a:r>
+                        <a:rPr lang="en-US" dirty="0" smtClean="0"/>
+                        <a:t>1512.071%</a:t>
                       </a:r>
                       <a:endParaRPr lang="en-US" dirty="0"/>
                     </a:p>
@@ -4078,7 +4080,7 @@
       </p:grpSpPr>
       <p:pic>
         <p:nvPicPr>
-          <p:cNvPr id="3" name="Picture 2"/>
+          <p:cNvPr id="2" name="Picture 1"/>
           <p:cNvPicPr>
             <a:picLocks noChangeAspect="1"/>
           </p:cNvPicPr>
@@ -4098,8 +4100,8 @@
         </p:blipFill>
         <p:spPr>
           <a:xfrm>
-            <a:off x="251581" y="308301"/>
-            <a:ext cx="11796485" cy="6417536"/>
+            <a:off x="0" y="112648"/>
+            <a:ext cx="12192000" cy="6632704"/>
           </a:xfrm>
           <a:prstGeom prst="rect">
             <a:avLst/>
@@ -4157,7 +4159,7 @@
       </p:sp>
       <p:pic>
         <p:nvPicPr>
-          <p:cNvPr id="7" name="Content Placeholder 6"/>
+          <p:cNvPr id="4" name="Content Placeholder 3"/>
           <p:cNvPicPr>
             <a:picLocks noGrp="1" noChangeAspect="1"/>
           </p:cNvPicPr>
@@ -4179,8 +4181,8 @@
         </p:blipFill>
         <p:spPr>
           <a:xfrm>
-            <a:off x="157897" y="233891"/>
-            <a:ext cx="11813970" cy="6427048"/>
+            <a:off x="239439" y="225788"/>
+            <a:ext cx="11846928" cy="6444978"/>
           </a:xfrm>
         </p:spPr>
       </p:pic>
@@ -4247,7 +4249,7 @@
             <p:ph idx="1"/>
             <p:extLst>
               <p:ext uri="{D42A27DB-BD31-4B8C-83A1-F6EECF244321}">
-                <p14:modId xmlns:p14="http://schemas.microsoft.com/office/powerpoint/2010/main" val="1215703056"/>
+                <p14:modId xmlns:p14="http://schemas.microsoft.com/office/powerpoint/2010/main" val="2486880436"/>
               </p:ext>
             </p:extLst>
           </p:nvPr>
@@ -4378,107 +4380,22 @@
                       <a:pPr algn="ctr"/>
                       <a:r>
                         <a:rPr lang="en-US" dirty="0" smtClean="0"/>
-                        <a:t>0.219</a:t>
-                      </a:r>
-                      <a:endParaRPr lang="en-US" dirty="0"/>
-                    </a:p>
-                  </a:txBody>
-                  <a:tcPr anchor="ctr"/>
-                </a:tc>
-                <a:tc>
-                  <a:txBody>
-                    <a:bodyPr/>
-                    <a:lstStyle/>
-                    <a:p>
-                      <a:pPr algn="ctr"/>
-                      <a:r>
-                        <a:rPr lang="en-US" dirty="0" smtClean="0"/>
-                        <a:t>1396.894</a:t>
-                      </a:r>
-                      <a:endParaRPr lang="en-US" dirty="0"/>
-                    </a:p>
-                  </a:txBody>
-                  <a:tcPr anchor="ctr"/>
-                </a:tc>
-                <a:tc>
-                  <a:txBody>
-                    <a:bodyPr/>
-                    <a:lstStyle/>
-                    <a:p>
-                      <a:pPr algn="ctr"/>
-                      <a:r>
-                        <a:rPr lang="en-US" dirty="0" smtClean="0"/>
-                        <a:t>30.387</a:t>
-                      </a:r>
-                      <a:endParaRPr lang="en-US" dirty="0"/>
-                    </a:p>
-                  </a:txBody>
-                  <a:tcPr anchor="ctr"/>
-                </a:tc>
-                <a:tc>
-                  <a:txBody>
-                    <a:bodyPr/>
-                    <a:lstStyle/>
-                    <a:p>
-                      <a:pPr algn="ctr"/>
-                      <a:r>
-                        <a:rPr lang="en-US" dirty="0" smtClean="0"/>
-                        <a:t>126.697</a:t>
-                      </a:r>
-                      <a:endParaRPr lang="en-US" dirty="0"/>
-                    </a:p>
-                  </a:txBody>
-                  <a:tcPr anchor="ctr"/>
-                </a:tc>
-              </a:tr>
-              <a:tr h="370840">
-                <a:tc>
-                  <a:txBody>
-                    <a:bodyPr/>
-                    <a:lstStyle/>
-                    <a:p>
-                      <a:pPr algn="ctr"/>
-                      <a:r>
-                        <a:rPr lang="en-US" dirty="0" smtClean="0"/>
-                        <a:t>minimization + </a:t>
-                      </a:r>
-                      <a:r>
-                        <a:rPr lang="en-US" dirty="0" err="1" smtClean="0"/>
-                        <a:t>All_IVCs</a:t>
-                      </a:r>
-                      <a:r>
-                        <a:rPr lang="en-US" baseline="0" dirty="0" smtClean="0"/>
-                        <a:t> + proof</a:t>
-                      </a:r>
-                      <a:endParaRPr lang="en-US" dirty="0"/>
-                    </a:p>
-                  </a:txBody>
-                  <a:tcPr anchor="ctr"/>
-                </a:tc>
-                <a:tc>
-                  <a:txBody>
-                    <a:bodyPr/>
-                    <a:lstStyle/>
-                    <a:p>
-                      <a:pPr algn="ctr"/>
-                      <a:r>
-                        <a:rPr lang="en-US" dirty="0" smtClean="0"/>
-                        <a:t>0.219</a:t>
-                      </a:r>
-                      <a:endParaRPr lang="en-US" dirty="0"/>
-                    </a:p>
-                  </a:txBody>
-                  <a:tcPr anchor="ctr"/>
-                </a:tc>
-                <a:tc>
-                  <a:txBody>
-                    <a:bodyPr/>
-                    <a:lstStyle/>
-                    <a:p>
-                      <a:pPr algn="ctr"/>
-                      <a:r>
-                        <a:rPr lang="en-US" dirty="0" smtClean="0"/>
-                        <a:t>1396.894</a:t>
+                        <a:t>0.25</a:t>
+                      </a:r>
+                      <a:endParaRPr lang="en-US" dirty="0"/>
+                    </a:p>
+                  </a:txBody>
+                  <a:tcPr anchor="ctr"/>
+                </a:tc>
+                <a:tc>
+                  <a:txBody>
+                    <a:bodyPr/>
+                    <a:lstStyle/>
+                    <a:p>
+                      <a:pPr algn="ctr"/>
+                      <a:r>
+                        <a:rPr lang="en-US" dirty="0" smtClean="0"/>
+                        <a:t>2388.501</a:t>
                       </a:r>
                       <a:endParaRPr lang="en-US" dirty="0"/>
                     </a:p>
@@ -4509,21 +4426,21 @@
                       </a:pPr>
                       <a:r>
                         <a:rPr lang="en-US" dirty="0" smtClean="0"/>
-                        <a:t>31.076</a:t>
-                      </a:r>
-                    </a:p>
-                  </a:txBody>
-                  <a:tcPr anchor="ctr"/>
-                </a:tc>
-                <a:tc>
-                  <a:txBody>
-                    <a:bodyPr/>
-                    <a:lstStyle/>
-                    <a:p>
-                      <a:pPr algn="ctr"/>
-                      <a:r>
-                        <a:rPr lang="en-US" dirty="0" smtClean="0"/>
-                        <a:t>128.583</a:t>
+                        <a:t>60.184</a:t>
+                      </a:r>
+                    </a:p>
+                  </a:txBody>
+                  <a:tcPr anchor="ctr"/>
+                </a:tc>
+                <a:tc>
+                  <a:txBody>
+                    <a:bodyPr/>
+                    <a:lstStyle/>
+                    <a:p>
+                      <a:pPr algn="ctr"/>
+                      <a:r>
+                        <a:rPr lang="en-US" dirty="0" smtClean="0"/>
+                        <a:t>257.736</a:t>
                       </a:r>
                       <a:endParaRPr lang="en-US" dirty="0"/>
                     </a:p>
@@ -4540,67 +4457,91 @@
                       <a:pPr algn="ctr"/>
                       <a:r>
                         <a:rPr lang="en-US" dirty="0" smtClean="0"/>
-                        <a:t>IVC_UC + proof time</a:t>
-                      </a:r>
-                      <a:endParaRPr lang="en-US" dirty="0"/>
-                    </a:p>
-                  </a:txBody>
-                  <a:tcPr anchor="ctr"/>
-                </a:tc>
-                <a:tc>
-                  <a:txBody>
-                    <a:bodyPr/>
-                    <a:lstStyle/>
-                    <a:p>
-                      <a:pPr algn="ctr"/>
-                      <a:r>
-                        <a:rPr lang="en-US" dirty="0" smtClean="0"/>
-                        <a:t>0.046</a:t>
-                      </a:r>
-                      <a:endParaRPr lang="en-US" dirty="0"/>
-                    </a:p>
-                  </a:txBody>
-                  <a:tcPr anchor="ctr"/>
-                </a:tc>
-                <a:tc>
-                  <a:txBody>
-                    <a:bodyPr/>
-                    <a:lstStyle/>
-                    <a:p>
-                      <a:pPr algn="ctr"/>
-                      <a:r>
-                        <a:rPr lang="en-US" dirty="0" smtClean="0"/>
-                        <a:t>21.997</a:t>
-                      </a:r>
-                      <a:endParaRPr lang="en-US" dirty="0"/>
-                    </a:p>
-                  </a:txBody>
-                  <a:tcPr anchor="ctr"/>
-                </a:tc>
-                <a:tc>
-                  <a:txBody>
-                    <a:bodyPr/>
-                    <a:lstStyle/>
-                    <a:p>
-                      <a:pPr algn="ctr"/>
-                      <a:r>
-                        <a:rPr lang="en-US" dirty="0" smtClean="0"/>
-                        <a:t>1.434</a:t>
-                      </a:r>
-                      <a:endParaRPr lang="en-US" dirty="0"/>
-                    </a:p>
-                  </a:txBody>
-                  <a:tcPr anchor="ctr"/>
-                </a:tc>
-                <a:tc>
-                  <a:txBody>
-                    <a:bodyPr/>
-                    <a:lstStyle/>
-                    <a:p>
-                      <a:pPr algn="ctr"/>
-                      <a:r>
-                        <a:rPr lang="en-US" dirty="0" smtClean="0"/>
-                        <a:t>2.331</a:t>
+                        <a:t>minimization + </a:t>
+                      </a:r>
+                      <a:r>
+                        <a:rPr lang="en-US" dirty="0" err="1" smtClean="0"/>
+                        <a:t>All_IVCs</a:t>
+                      </a:r>
+                      <a:r>
+                        <a:rPr lang="en-US" baseline="0" dirty="0" smtClean="0"/>
+                        <a:t> + proof</a:t>
+                      </a:r>
+                      <a:endParaRPr lang="en-US" dirty="0"/>
+                    </a:p>
+                  </a:txBody>
+                  <a:tcPr anchor="ctr"/>
+                </a:tc>
+                <a:tc>
+                  <a:txBody>
+                    <a:bodyPr/>
+                    <a:lstStyle/>
+                    <a:p>
+                      <a:pPr algn="ctr"/>
+                      <a:r>
+                        <a:rPr lang="en-US" dirty="0" smtClean="0"/>
+                        <a:t>0.25</a:t>
+                      </a:r>
+                      <a:endParaRPr lang="en-US" dirty="0"/>
+                    </a:p>
+                  </a:txBody>
+                  <a:tcPr anchor="ctr"/>
+                </a:tc>
+                <a:tc>
+                  <a:txBody>
+                    <a:bodyPr/>
+                    <a:lstStyle/>
+                    <a:p>
+                      <a:pPr algn="ctr"/>
+                      <a:r>
+                        <a:rPr lang="en-US" dirty="0" smtClean="0"/>
+                        <a:t>2388.502</a:t>
+                      </a:r>
+                      <a:endParaRPr lang="en-US" dirty="0"/>
+                    </a:p>
+                  </a:txBody>
+                  <a:tcPr anchor="ctr"/>
+                </a:tc>
+                <a:tc>
+                  <a:txBody>
+                    <a:bodyPr/>
+                    <a:lstStyle/>
+                    <a:p>
+                      <a:pPr marL="0" marR="0" indent="0" algn="ctr" defTabSz="914400" rtl="0" eaLnBrk="1" fontAlgn="auto" latinLnBrk="0" hangingPunct="1">
+                        <a:lnSpc>
+                          <a:spcPct val="100000"/>
+                        </a:lnSpc>
+                        <a:spcBef>
+                          <a:spcPts val="0"/>
+                        </a:spcBef>
+                        <a:spcAft>
+                          <a:spcPts val="0"/>
+                        </a:spcAft>
+                        <a:buClrTx/>
+                        <a:buSzTx/>
+                        <a:buFontTx/>
+                        <a:buNone/>
+                        <a:tabLst/>
+                        <a:defRPr/>
+                      </a:pPr>
+                      <a:r>
+                        <a:rPr lang="en-US" dirty="0" smtClean="0"/>
+                        <a:t>60.260</a:t>
+                      </a:r>
+                      <a:endParaRPr lang="en-US" dirty="0" smtClean="0"/>
+                    </a:p>
+                  </a:txBody>
+                  <a:tcPr anchor="ctr"/>
+                </a:tc>
+                <a:tc>
+                  <a:txBody>
+                    <a:bodyPr/>
+                    <a:lstStyle/>
+                    <a:p>
+                      <a:pPr algn="ctr"/>
+                      <a:r>
+                        <a:rPr lang="en-US" dirty="0" smtClean="0"/>
+                        <a:t>257.868</a:t>
                       </a:r>
                       <a:endParaRPr lang="en-US" dirty="0"/>
                     </a:p>
@@ -4617,67 +4558,67 @@
                       <a:pPr algn="ctr"/>
                       <a:r>
                         <a:rPr lang="en-US" dirty="0" smtClean="0"/>
-                        <a:t>IVC_UCBF + proof time</a:t>
-                      </a:r>
-                      <a:endParaRPr lang="en-US" dirty="0"/>
-                    </a:p>
-                  </a:txBody>
-                  <a:tcPr anchor="ctr"/>
-                </a:tc>
-                <a:tc>
-                  <a:txBody>
-                    <a:bodyPr/>
-                    <a:lstStyle/>
-                    <a:p>
-                      <a:pPr algn="ctr"/>
-                      <a:r>
-                        <a:rPr lang="en-US" dirty="0" smtClean="0"/>
-                        <a:t>0.219</a:t>
-                      </a:r>
-                      <a:endParaRPr lang="en-US" dirty="0"/>
-                    </a:p>
-                  </a:txBody>
-                  <a:tcPr anchor="ctr"/>
-                </a:tc>
-                <a:tc>
-                  <a:txBody>
-                    <a:bodyPr/>
-                    <a:lstStyle/>
-                    <a:p>
-                      <a:pPr algn="ctr"/>
-                      <a:r>
-                        <a:rPr lang="en-US" dirty="0" smtClean="0"/>
-                        <a:t>1286.479</a:t>
-                      </a:r>
-                      <a:endParaRPr lang="en-US" dirty="0"/>
-                    </a:p>
-                  </a:txBody>
-                  <a:tcPr anchor="ctr"/>
-                </a:tc>
-                <a:tc>
-                  <a:txBody>
-                    <a:bodyPr/>
-                    <a:lstStyle/>
-                    <a:p>
-                      <a:pPr algn="ctr"/>
-                      <a:r>
-                        <a:rPr lang="en-US" dirty="0" smtClean="0"/>
-                        <a:t>20.776</a:t>
-                      </a:r>
-                      <a:endParaRPr lang="en-US" dirty="0"/>
-                    </a:p>
-                  </a:txBody>
-                  <a:tcPr anchor="ctr"/>
-                </a:tc>
-                <a:tc>
-                  <a:txBody>
-                    <a:bodyPr/>
-                    <a:lstStyle/>
-                    <a:p>
-                      <a:pPr algn="ctr"/>
-                      <a:r>
-                        <a:rPr lang="en-US" dirty="0" smtClean="0"/>
-                        <a:t>108.626</a:t>
+                        <a:t>IVC_UC + proof time</a:t>
+                      </a:r>
+                      <a:endParaRPr lang="en-US" dirty="0"/>
+                    </a:p>
+                  </a:txBody>
+                  <a:tcPr anchor="ctr"/>
+                </a:tc>
+                <a:tc>
+                  <a:txBody>
+                    <a:bodyPr/>
+                    <a:lstStyle/>
+                    <a:p>
+                      <a:pPr algn="ctr"/>
+                      <a:r>
+                        <a:rPr lang="en-US" dirty="0" smtClean="0"/>
+                        <a:t>0.062</a:t>
+                      </a:r>
+                      <a:endParaRPr lang="en-US" dirty="0"/>
+                    </a:p>
+                  </a:txBody>
+                  <a:tcPr anchor="ctr"/>
+                </a:tc>
+                <a:tc>
+                  <a:txBody>
+                    <a:bodyPr/>
+                    <a:lstStyle/>
+                    <a:p>
+                      <a:pPr algn="ctr"/>
+                      <a:r>
+                        <a:rPr lang="en-US" dirty="0" smtClean="0"/>
+                        <a:t>14.758</a:t>
+                      </a:r>
+                      <a:endParaRPr lang="en-US" dirty="0"/>
+                    </a:p>
+                  </a:txBody>
+                  <a:tcPr anchor="ctr"/>
+                </a:tc>
+                <a:tc>
+                  <a:txBody>
+                    <a:bodyPr/>
+                    <a:lstStyle/>
+                    <a:p>
+                      <a:pPr algn="ctr"/>
+                      <a:r>
+                        <a:rPr lang="en-US" dirty="0" smtClean="0"/>
+                        <a:t>1.384</a:t>
+                      </a:r>
+                      <a:endParaRPr lang="en-US" dirty="0"/>
+                    </a:p>
+                  </a:txBody>
+                  <a:tcPr anchor="ctr"/>
+                </a:tc>
+                <a:tc>
+                  <a:txBody>
+                    <a:bodyPr/>
+                    <a:lstStyle/>
+                    <a:p>
+                      <a:pPr algn="ctr"/>
+                      <a:r>
+                        <a:rPr lang="en-US" dirty="0" smtClean="0"/>
+                        <a:t>2.046</a:t>
                       </a:r>
                       <a:endParaRPr lang="en-US" dirty="0"/>
                     </a:p>
@@ -4694,67 +4635,67 @@
                       <a:pPr algn="ctr"/>
                       <a:r>
                         <a:rPr lang="en-US" dirty="0" smtClean="0"/>
-                        <a:t>Proof time</a:t>
-                      </a:r>
-                      <a:endParaRPr lang="en-US" dirty="0"/>
-                    </a:p>
-                  </a:txBody>
-                  <a:tcPr anchor="ctr"/>
-                </a:tc>
-                <a:tc>
-                  <a:txBody>
-                    <a:bodyPr/>
-                    <a:lstStyle/>
-                    <a:p>
-                      <a:pPr algn="ctr"/>
-                      <a:r>
-                        <a:rPr lang="en-US" dirty="0" smtClean="0"/>
-                        <a:t>0.046</a:t>
-                      </a:r>
-                      <a:endParaRPr lang="en-US" dirty="0"/>
-                    </a:p>
-                  </a:txBody>
-                  <a:tcPr anchor="ctr"/>
-                </a:tc>
-                <a:tc>
-                  <a:txBody>
-                    <a:bodyPr/>
-                    <a:lstStyle/>
-                    <a:p>
-                      <a:pPr algn="ctr"/>
-                      <a:r>
-                        <a:rPr lang="en-US" dirty="0" smtClean="0"/>
-                        <a:t>21.825</a:t>
-                      </a:r>
-                      <a:endParaRPr lang="en-US" dirty="0"/>
-                    </a:p>
-                  </a:txBody>
-                  <a:tcPr anchor="ctr"/>
-                </a:tc>
-                <a:tc>
-                  <a:txBody>
-                    <a:bodyPr/>
-                    <a:lstStyle/>
-                    <a:p>
-                      <a:pPr algn="ctr"/>
-                      <a:r>
-                        <a:rPr lang="en-US" dirty="0" smtClean="0"/>
-                        <a:t>1.351</a:t>
-                      </a:r>
-                      <a:endParaRPr lang="en-US" dirty="0"/>
-                    </a:p>
-                  </a:txBody>
-                  <a:tcPr anchor="ctr"/>
-                </a:tc>
-                <a:tc>
-                  <a:txBody>
-                    <a:bodyPr/>
-                    <a:lstStyle/>
-                    <a:p>
-                      <a:pPr algn="ctr"/>
-                      <a:r>
-                        <a:rPr lang="en-US" dirty="0" smtClean="0"/>
-                        <a:t>2.241</a:t>
+                        <a:t>IVC_UCBF + proof time</a:t>
+                      </a:r>
+                      <a:endParaRPr lang="en-US" dirty="0"/>
+                    </a:p>
+                  </a:txBody>
+                  <a:tcPr anchor="ctr"/>
+                </a:tc>
+                <a:tc>
+                  <a:txBody>
+                    <a:bodyPr/>
+                    <a:lstStyle/>
+                    <a:p>
+                      <a:pPr algn="ctr"/>
+                      <a:r>
+                        <a:rPr lang="en-US" dirty="0" smtClean="0"/>
+                        <a:t>0.248</a:t>
+                      </a:r>
+                      <a:endParaRPr lang="en-US" dirty="0"/>
+                    </a:p>
+                  </a:txBody>
+                  <a:tcPr anchor="ctr"/>
+                </a:tc>
+                <a:tc>
+                  <a:txBody>
+                    <a:bodyPr/>
+                    <a:lstStyle/>
+                    <a:p>
+                      <a:pPr algn="ctr"/>
+                      <a:r>
+                        <a:rPr lang="en-US" dirty="0" smtClean="0"/>
+                        <a:t>1323.515</a:t>
+                      </a:r>
+                      <a:endParaRPr lang="en-US" dirty="0"/>
+                    </a:p>
+                  </a:txBody>
+                  <a:tcPr anchor="ctr"/>
+                </a:tc>
+                <a:tc>
+                  <a:txBody>
+                    <a:bodyPr/>
+                    <a:lstStyle/>
+                    <a:p>
+                      <a:pPr algn="ctr"/>
+                      <a:r>
+                        <a:rPr lang="en-US" dirty="0" smtClean="0"/>
+                        <a:t>17.247</a:t>
+                      </a:r>
+                      <a:endParaRPr lang="en-US" dirty="0"/>
+                    </a:p>
+                  </a:txBody>
+                  <a:tcPr anchor="ctr"/>
+                </a:tc>
+                <a:tc>
+                  <a:txBody>
+                    <a:bodyPr/>
+                    <a:lstStyle/>
+                    <a:p>
+                      <a:pPr algn="ctr"/>
+                      <a:r>
+                        <a:rPr lang="en-US" dirty="0" smtClean="0"/>
+                        <a:t>104.838</a:t>
                       </a:r>
                       <a:endParaRPr lang="en-US" dirty="0"/>
                     </a:p>
@@ -4770,6 +4711,83 @@
                     <a:p>
                       <a:pPr algn="ctr"/>
                       <a:r>
+                        <a:rPr lang="en-US" dirty="0" smtClean="0"/>
+                        <a:t>Proof time</a:t>
+                      </a:r>
+                      <a:endParaRPr lang="en-US" dirty="0"/>
+                    </a:p>
+                  </a:txBody>
+                  <a:tcPr anchor="ctr"/>
+                </a:tc>
+                <a:tc>
+                  <a:txBody>
+                    <a:bodyPr/>
+                    <a:lstStyle/>
+                    <a:p>
+                      <a:pPr algn="ctr"/>
+                      <a:r>
+                        <a:rPr lang="en-US" dirty="0" smtClean="0"/>
+                        <a:t>0.047</a:t>
+                      </a:r>
+                      <a:endParaRPr lang="en-US" dirty="0"/>
+                    </a:p>
+                  </a:txBody>
+                  <a:tcPr anchor="ctr"/>
+                </a:tc>
+                <a:tc>
+                  <a:txBody>
+                    <a:bodyPr/>
+                    <a:lstStyle/>
+                    <a:p>
+                      <a:pPr algn="ctr"/>
+                      <a:r>
+                        <a:rPr lang="en-US" dirty="0" smtClean="0"/>
+                        <a:t>14.617</a:t>
+                      </a:r>
+                      <a:endParaRPr lang="en-US" dirty="0"/>
+                    </a:p>
+                  </a:txBody>
+                  <a:tcPr anchor="ctr"/>
+                </a:tc>
+                <a:tc>
+                  <a:txBody>
+                    <a:bodyPr/>
+                    <a:lstStyle/>
+                    <a:p>
+                      <a:pPr algn="ctr"/>
+                      <a:r>
+                        <a:rPr lang="en-US" dirty="0" smtClean="0"/>
+                        <a:t>1.299</a:t>
+                      </a:r>
+                      <a:endParaRPr lang="en-US" dirty="0"/>
+                    </a:p>
+                  </a:txBody>
+                  <a:tcPr anchor="ctr"/>
+                </a:tc>
+                <a:tc>
+                  <a:txBody>
+                    <a:bodyPr/>
+                    <a:lstStyle/>
+                    <a:p>
+                      <a:pPr algn="ctr"/>
+                      <a:r>
+                        <a:rPr lang="en-US" dirty="0" smtClean="0"/>
+                        <a:t>1.940</a:t>
+                      </a:r>
+                      <a:endParaRPr lang="en-US" dirty="0"/>
+                    </a:p>
+                  </a:txBody>
+                  <a:tcPr anchor="ctr"/>
+                </a:tc>
+              </a:tr>
+              <a:tr h="370840">
+                <a:tc>
+                  <a:txBody>
+                    <a:bodyPr/>
+                    <a:lstStyle/>
+                    <a:p>
+                      <a:pPr algn="ctr"/>
+                      <a:r>
                         <a:rPr lang="en-US" dirty="0" err="1" smtClean="0"/>
                         <a:t>All_IVCs</a:t>
                       </a:r>
@@ -4786,52 +4804,52 @@
                       <a:pPr algn="ctr"/>
                       <a:r>
                         <a:rPr lang="en-US" dirty="0" smtClean="0"/>
-                        <a:t>0.141</a:t>
-                      </a:r>
-                      <a:endParaRPr lang="en-US" dirty="0"/>
-                    </a:p>
-                  </a:txBody>
-                  <a:tcPr anchor="ctr"/>
-                </a:tc>
-                <a:tc>
-                  <a:txBody>
-                    <a:bodyPr/>
-                    <a:lstStyle/>
-                    <a:p>
-                      <a:pPr algn="ctr"/>
-                      <a:r>
-                        <a:rPr lang="en-US" dirty="0" smtClean="0"/>
-                        <a:t>1375.069</a:t>
-                      </a:r>
-                      <a:endParaRPr lang="en-US" dirty="0"/>
-                    </a:p>
-                  </a:txBody>
-                  <a:tcPr anchor="ctr"/>
-                </a:tc>
-                <a:tc>
-                  <a:txBody>
-                    <a:bodyPr/>
-                    <a:lstStyle/>
-                    <a:p>
-                      <a:pPr algn="ctr"/>
-                      <a:r>
-                        <a:rPr lang="en-US" dirty="0" smtClean="0"/>
-                        <a:t>29.036</a:t>
-                      </a:r>
-                      <a:endParaRPr lang="en-US" dirty="0"/>
-                    </a:p>
-                  </a:txBody>
-                  <a:tcPr anchor="ctr"/>
-                </a:tc>
-                <a:tc>
-                  <a:txBody>
-                    <a:bodyPr/>
-                    <a:lstStyle/>
-                    <a:p>
-                      <a:pPr algn="ctr"/>
-                      <a:r>
-                        <a:rPr lang="en-US" dirty="0" smtClean="0"/>
-                        <a:t>125.035</a:t>
+                        <a:t>0.125</a:t>
+                      </a:r>
+                      <a:endParaRPr lang="en-US" dirty="0"/>
+                    </a:p>
+                  </a:txBody>
+                  <a:tcPr anchor="ctr"/>
+                </a:tc>
+                <a:tc>
+                  <a:txBody>
+                    <a:bodyPr/>
+                    <a:lstStyle/>
+                    <a:p>
+                      <a:pPr algn="ctr"/>
+                      <a:r>
+                        <a:rPr lang="en-US" dirty="0" smtClean="0"/>
+                        <a:t>2375.058</a:t>
+                      </a:r>
+                      <a:endParaRPr lang="en-US" dirty="0"/>
+                    </a:p>
+                  </a:txBody>
+                  <a:tcPr anchor="ctr"/>
+                </a:tc>
+                <a:tc>
+                  <a:txBody>
+                    <a:bodyPr/>
+                    <a:lstStyle/>
+                    <a:p>
+                      <a:pPr algn="ctr"/>
+                      <a:r>
+                        <a:rPr lang="en-US" dirty="0" smtClean="0"/>
+                        <a:t>58.884</a:t>
+                      </a:r>
+                      <a:endParaRPr lang="en-US" dirty="0"/>
+                    </a:p>
+                  </a:txBody>
+                  <a:tcPr anchor="ctr"/>
+                </a:tc>
+                <a:tc>
+                  <a:txBody>
+                    <a:bodyPr/>
+                    <a:lstStyle/>
+                    <a:p>
+                      <a:pPr algn="ctr"/>
+                      <a:r>
+                        <a:rPr lang="en-US" dirty="0" smtClean="0"/>
+                        <a:t>256.529</a:t>
                       </a:r>
                       <a:endParaRPr lang="en-US" dirty="0"/>
                     </a:p>
@@ -4878,7 +4896,7 @@
                       <a:pPr algn="ctr"/>
                       <a:r>
                         <a:rPr lang="en-US" dirty="0" smtClean="0"/>
-                        <a:t>1.32</a:t>
+                        <a:t>1.422</a:t>
                       </a:r>
                       <a:endParaRPr lang="en-US" dirty="0"/>
                     </a:p>
@@ -4908,7 +4926,7 @@
                       <a:pPr algn="ctr"/>
                       <a:r>
                         <a:rPr lang="en-US" dirty="0" smtClean="0"/>
-                        <a:t>0.178</a:t>
+                        <a:t>0.184</a:t>
                       </a:r>
                       <a:endParaRPr lang="en-US" dirty="0"/>
                     </a:p>
@@ -4955,37 +4973,37 @@
                       <a:pPr algn="ctr"/>
                       <a:r>
                         <a:rPr lang="en-US" dirty="0" smtClean="0"/>
-                        <a:t>106.21</a:t>
-                      </a:r>
-                      <a:endParaRPr lang="en-US" dirty="0"/>
-                    </a:p>
-                  </a:txBody>
-                  <a:tcPr anchor="ctr"/>
-                </a:tc>
-                <a:tc>
-                  <a:txBody>
-                    <a:bodyPr/>
-                    <a:lstStyle/>
-                    <a:p>
-                      <a:pPr algn="ctr"/>
-                      <a:r>
-                        <a:rPr lang="en-US" dirty="0" smtClean="0"/>
-                        <a:t>0.689</a:t>
-                      </a:r>
-                      <a:endParaRPr lang="en-US" dirty="0"/>
-                    </a:p>
-                  </a:txBody>
-                  <a:tcPr anchor="ctr"/>
-                </a:tc>
-                <a:tc>
-                  <a:txBody>
-                    <a:bodyPr/>
-                    <a:lstStyle/>
-                    <a:p>
-                      <a:pPr algn="ctr"/>
-                      <a:r>
-                        <a:rPr lang="en-US" dirty="0" smtClean="0"/>
-                        <a:t>5.321</a:t>
+                        <a:t>5.797</a:t>
+                      </a:r>
+                      <a:endParaRPr lang="en-US" dirty="0"/>
+                    </a:p>
+                  </a:txBody>
+                  <a:tcPr anchor="ctr"/>
+                </a:tc>
+                <a:tc>
+                  <a:txBody>
+                    <a:bodyPr/>
+                    <a:lstStyle/>
+                    <a:p>
+                      <a:pPr algn="ctr"/>
+                      <a:r>
+                        <a:rPr lang="en-US" dirty="0" smtClean="0"/>
+                        <a:t>0.077</a:t>
+                      </a:r>
+                      <a:endParaRPr lang="en-US" dirty="0"/>
+                    </a:p>
+                  </a:txBody>
+                  <a:tcPr anchor="ctr"/>
+                </a:tc>
+                <a:tc>
+                  <a:txBody>
+                    <a:bodyPr/>
+                    <a:lstStyle/>
+                    <a:p>
+                      <a:pPr algn="ctr"/>
+                      <a:r>
+                        <a:rPr lang="en-US" dirty="0" smtClean="0"/>
+                        <a:t>0.364</a:t>
                       </a:r>
                       <a:endParaRPr lang="en-US" dirty="0"/>
                     </a:p>
@@ -5048,7 +5066,7 @@
       </p:sp>
       <p:pic>
         <p:nvPicPr>
-          <p:cNvPr id="4" name="Content Placeholder 3"/>
+          <p:cNvPr id="5" name="Content Placeholder 4"/>
           <p:cNvPicPr>
             <a:picLocks noGrp="1" noChangeAspect="1"/>
           </p:cNvPicPr>
@@ -5070,8 +5088,8 @@
         </p:blipFill>
         <p:spPr>
           <a:xfrm>
-            <a:off x="411895" y="225425"/>
-            <a:ext cx="11522547" cy="6268508"/>
+            <a:off x="335696" y="365125"/>
+            <a:ext cx="11771638" cy="6569075"/>
           </a:xfrm>
         </p:spPr>
       </p:pic>
@@ -5126,7 +5144,7 @@
       </p:sp>
       <p:pic>
         <p:nvPicPr>
-          <p:cNvPr id="4" name="Content Placeholder 3"/>
+          <p:cNvPr id="5" name="Content Placeholder 4"/>
           <p:cNvPicPr>
             <a:picLocks noGrp="1" noChangeAspect="1"/>
           </p:cNvPicPr>
@@ -5148,8 +5166,8 @@
         </p:blipFill>
         <p:spPr>
           <a:xfrm>
-            <a:off x="194732" y="360097"/>
-            <a:ext cx="11773017" cy="6404769"/>
+            <a:off x="149430" y="208492"/>
+            <a:ext cx="11890170" cy="6649508"/>
           </a:xfrm>
         </p:spPr>
       </p:pic>
@@ -5204,7 +5222,7 @@
       </p:sp>
       <p:pic>
         <p:nvPicPr>
-          <p:cNvPr id="7" name="Content Placeholder 6"/>
+          <p:cNvPr id="4" name="Content Placeholder 3"/>
           <p:cNvPicPr>
             <a:picLocks noGrp="1" noChangeAspect="1"/>
           </p:cNvPicPr>
@@ -5226,8 +5244,8 @@
         </p:blipFill>
         <p:spPr>
           <a:xfrm>
-            <a:off x="122177" y="275499"/>
-            <a:ext cx="11947645" cy="6499770"/>
+            <a:off x="267963" y="242357"/>
+            <a:ext cx="11896064" cy="6471709"/>
           </a:xfrm>
         </p:spPr>
       </p:pic>
@@ -5282,7 +5300,7 @@
       </p:sp>
       <p:pic>
         <p:nvPicPr>
-          <p:cNvPr id="5" name="Content Placeholder 4"/>
+          <p:cNvPr id="4" name="Content Placeholder 3"/>
           <p:cNvPicPr>
             <a:picLocks noGrp="1" noChangeAspect="1"/>
           </p:cNvPicPr>
@@ -5304,8 +5322,8 @@
         </p:blipFill>
         <p:spPr>
           <a:xfrm>
-            <a:off x="146042" y="301625"/>
-            <a:ext cx="12045958" cy="6553254"/>
+            <a:off x="352630" y="250825"/>
+            <a:ext cx="11839370" cy="6463242"/>
           </a:xfrm>
         </p:spPr>
       </p:pic>

</xml_diff>